<commit_message>
modify spring mvc slides
</commit_message>
<xml_diff>
--- a/3_Spring_MVC.pptx
+++ b/3_Spring_MVC.pptx
@@ -227,7 +227,7 @@
           <a:p>
             <a:fld id="{A1D383EF-5937-974A-B794-6BEA19B364D1}" type="datetimeFigureOut">
               <a:rPr lang="en-US" smtClean="0"/>
-              <a:t>2/18/2019</a:t>
+              <a:t>2/19/2019</a:t>
             </a:fld>
             <a:endParaRPr lang="en-US"/>
           </a:p>
@@ -1450,7 +1450,7 @@
             <a:fld id="{04AF466F-BDA4-4F18-9C7B-FF0A9A1B0E80}" type="datetime1">
               <a:rPr lang="en-US" smtClean="0"/>
               <a:pPr/>
-              <a:t>2/18/2019</a:t>
+              <a:t>2/19/2019</a:t>
             </a:fld>
             <a:endParaRPr lang="en-US"/>
           </a:p>
@@ -1703,7 +1703,7 @@
             <a:fld id="{327B613C-1AD7-49D3-885D-F654C5CDBAA6}" type="datetime1">
               <a:rPr lang="en-US" smtClean="0"/>
               <a:pPr/>
-              <a:t>2/18/2019</a:t>
+              <a:t>2/19/2019</a:t>
             </a:fld>
             <a:endParaRPr lang="en-US" dirty="0"/>
           </a:p>
@@ -2020,7 +2020,7 @@
             <a:fld id="{327B613C-1AD7-49D3-885D-F654C5CDBAA6}" type="datetime1">
               <a:rPr lang="en-US" smtClean="0"/>
               <a:pPr/>
-              <a:t>2/18/2019</a:t>
+              <a:t>2/19/2019</a:t>
             </a:fld>
             <a:endParaRPr lang="en-US" dirty="0"/>
           </a:p>
@@ -2356,7 +2356,7 @@
             <a:fld id="{327B613C-1AD7-49D3-885D-F654C5CDBAA6}" type="datetime1">
               <a:rPr lang="en-US" smtClean="0"/>
               <a:pPr/>
-              <a:t>2/18/2019</a:t>
+              <a:t>2/19/2019</a:t>
             </a:fld>
             <a:endParaRPr lang="en-US" dirty="0"/>
           </a:p>
@@ -2673,7 +2673,7 @@
             <a:fld id="{327B613C-1AD7-49D3-885D-F654C5CDBAA6}" type="datetime1">
               <a:rPr lang="en-US" smtClean="0"/>
               <a:pPr/>
-              <a:t>2/18/2019</a:t>
+              <a:t>2/19/2019</a:t>
             </a:fld>
             <a:endParaRPr lang="en-US" dirty="0"/>
           </a:p>
@@ -3069,7 +3069,7 @@
             <a:fld id="{327B613C-1AD7-49D3-885D-F654C5CDBAA6}" type="datetime1">
               <a:rPr lang="en-US" smtClean="0"/>
               <a:pPr/>
-              <a:t>2/18/2019</a:t>
+              <a:t>2/19/2019</a:t>
             </a:fld>
             <a:endParaRPr lang="en-US" dirty="0"/>
           </a:p>
@@ -3242,7 +3242,7 @@
             <a:fld id="{58FB4290-6522-4139-852E-05BD9E7F0D2E}" type="datetime1">
               <a:rPr lang="en-US" smtClean="0"/>
               <a:pPr/>
-              <a:t>2/18/2019</a:t>
+              <a:t>2/19/2019</a:t>
             </a:fld>
             <a:endParaRPr lang="en-US"/>
           </a:p>
@@ -3424,7 +3424,7 @@
             <a:fld id="{AAB955F9-81EA-47C5-8059-9E5C2B437C70}" type="datetime1">
               <a:rPr lang="en-US" smtClean="0"/>
               <a:pPr/>
-              <a:t>2/18/2019</a:t>
+              <a:t>2/19/2019</a:t>
             </a:fld>
             <a:endParaRPr lang="en-US"/>
           </a:p>
@@ -3596,7 +3596,7 @@
             <a:fld id="{1CEF607B-A47E-422C-9BEF-122CCDB7C526}" type="datetime1">
               <a:rPr lang="en-US" smtClean="0"/>
               <a:pPr/>
-              <a:t>2/18/2019</a:t>
+              <a:t>2/19/2019</a:t>
             </a:fld>
             <a:endParaRPr lang="en-US"/>
           </a:p>
@@ -3845,7 +3845,7 @@
             <a:fld id="{63A9A7CB-BEE6-4F99-898E-913F06E8E125}" type="datetime1">
               <a:rPr lang="en-US" smtClean="0"/>
               <a:pPr/>
-              <a:t>2/18/2019</a:t>
+              <a:t>2/19/2019</a:t>
             </a:fld>
             <a:endParaRPr lang="en-US"/>
           </a:p>
@@ -4144,7 +4144,7 @@
             <a:fld id="{B6EE300C-6FC5-4FC3-AF1A-075E4F50620D}" type="datetime1">
               <a:rPr lang="en-US" smtClean="0"/>
               <a:pPr/>
-              <a:t>2/18/2019</a:t>
+              <a:t>2/19/2019</a:t>
             </a:fld>
             <a:endParaRPr lang="en-US"/>
           </a:p>
@@ -4525,7 +4525,7 @@
             <a:fld id="{F50D295D-4A77-4DEB-B04C-9F4282A8BC04}" type="datetime1">
               <a:rPr lang="en-US" smtClean="0"/>
               <a:pPr/>
-              <a:t>2/18/2019</a:t>
+              <a:t>2/19/2019</a:t>
             </a:fld>
             <a:endParaRPr lang="en-US"/>
           </a:p>
@@ -4650,7 +4650,7 @@
             <a:fld id="{02B28685-4D0C-42D5-8013-B5904CD1FCBC}" type="datetime1">
               <a:rPr lang="en-US" smtClean="0"/>
               <a:pPr/>
-              <a:t>2/18/2019</a:t>
+              <a:t>2/19/2019</a:t>
             </a:fld>
             <a:endParaRPr lang="en-US"/>
           </a:p>
@@ -4747,7 +4747,7 @@
             <a:fld id="{FDF226C0-9885-4BA9-BBFA-A52CBFEBB775}" type="datetime1">
               <a:rPr lang="en-US" smtClean="0"/>
               <a:pPr/>
-              <a:t>2/18/2019</a:t>
+              <a:t>2/19/2019</a:t>
             </a:fld>
             <a:endParaRPr lang="en-US"/>
           </a:p>
@@ -5004,7 +5004,7 @@
             <a:fld id="{327B613C-1AD7-49D3-885D-F654C5CDBAA6}" type="datetime1">
               <a:rPr lang="en-US" smtClean="0"/>
               <a:pPr/>
-              <a:t>2/18/2019</a:t>
+              <a:t>2/19/2019</a:t>
             </a:fld>
             <a:endParaRPr lang="en-US" dirty="0"/>
           </a:p>
@@ -5270,7 +5270,7 @@
             <a:fld id="{327B613C-1AD7-49D3-885D-F654C5CDBAA6}" type="datetime1">
               <a:rPr lang="en-US" smtClean="0"/>
               <a:pPr/>
-              <a:t>2/18/2019</a:t>
+              <a:t>2/19/2019</a:t>
             </a:fld>
             <a:endParaRPr lang="en-US" dirty="0"/>
           </a:p>
@@ -6086,7 +6086,7 @@
             <a:fld id="{327B613C-1AD7-49D3-885D-F654C5CDBAA6}" type="datetime1">
               <a:rPr lang="en-US" smtClean="0"/>
               <a:pPr/>
-              <a:t>2/18/2019</a:t>
+              <a:t>2/19/2019</a:t>
             </a:fld>
             <a:endParaRPr lang="en-US" dirty="0"/>
           </a:p>
@@ -8923,22 +8923,36 @@
             </a:pPr>
             <a:r>
               <a:rPr lang="en-US" b="1" dirty="0"/>
-              <a:t>	accept vs content-type</a:t>
-            </a:r>
-          </a:p>
-          <a:p>
-            <a:pPr marL="0" indent="0">
-              <a:buNone/>
-            </a:pPr>
-            <a:r>
-              <a:rPr lang="en-US" b="1" dirty="0"/>
-              <a:t>	@</a:t>
+              <a:t>	Front-End: </a:t>
             </a:r>
             <a:r>
               <a:rPr lang="en-US" b="1" dirty="0" err="1"/>
               <a:t>RequestHeader</a:t>
             </a:r>
-            <a:endParaRPr lang="en-US" b="1" dirty="0"/>
+            <a:r>
+              <a:rPr lang="en-US" b="1" dirty="0"/>
+              <a:t> contains:  </a:t>
+            </a:r>
+            <a:r>
+              <a:rPr lang="en-US" b="1" dirty="0">
+                <a:solidFill>
+                  <a:srgbClr val="FF0000"/>
+                </a:solidFill>
+              </a:rPr>
+              <a:t>accept</a:t>
+            </a:r>
+            <a:r>
+              <a:rPr lang="en-US" b="1" dirty="0"/>
+              <a:t> vs </a:t>
+            </a:r>
+            <a:r>
+              <a:rPr lang="en-US" b="1" dirty="0">
+                <a:solidFill>
+                  <a:srgbClr val="FF0000"/>
+                </a:solidFill>
+              </a:rPr>
+              <a:t>content-type</a:t>
+            </a:r>
           </a:p>
           <a:p>
             <a:pPr marL="0" indent="0">
@@ -8946,7 +8960,64 @@
             </a:pPr>
             <a:r>
               <a:rPr lang="en-US" b="1" dirty="0"/>
-              <a:t>	produces</a:t>
+              <a:t>	Back-End: use </a:t>
+            </a:r>
+            <a:r>
+              <a:rPr lang="en-US" b="1" dirty="0">
+                <a:solidFill>
+                  <a:srgbClr val="FF0000"/>
+                </a:solidFill>
+              </a:rPr>
+              <a:t>@</a:t>
+            </a:r>
+            <a:r>
+              <a:rPr lang="en-US" b="1" dirty="0" err="1">
+                <a:solidFill>
+                  <a:srgbClr val="FF0000"/>
+                </a:solidFill>
+              </a:rPr>
+              <a:t>RequestHeader</a:t>
+            </a:r>
+            <a:r>
+              <a:rPr lang="en-US" b="1" dirty="0">
+                <a:solidFill>
+                  <a:srgbClr val="FF0000"/>
+                </a:solidFill>
+              </a:rPr>
+              <a:t> </a:t>
+            </a:r>
+            <a:r>
+              <a:rPr lang="en-US" b="1" dirty="0"/>
+              <a:t>in controller to get them</a:t>
+            </a:r>
+          </a:p>
+          <a:p>
+            <a:pPr marL="0" indent="0">
+              <a:buNone/>
+            </a:pPr>
+            <a:r>
+              <a:rPr lang="en-US" b="1" dirty="0"/>
+              <a:t>	Back-End: </a:t>
+            </a:r>
+            <a:r>
+              <a:rPr lang="en-US" b="1" dirty="0">
+                <a:solidFill>
+                  <a:srgbClr val="FF0000"/>
+                </a:solidFill>
+              </a:rPr>
+              <a:t>produces-&gt;accept </a:t>
+            </a:r>
+            <a:r>
+              <a:rPr lang="en-US" b="1" dirty="0"/>
+              <a:t>&amp;&amp; </a:t>
+            </a:r>
+            <a:r>
+              <a:rPr lang="en-US" b="1" dirty="0">
+                <a:solidFill>
+                  <a:srgbClr val="FF0000"/>
+                </a:solidFill>
+              </a:rPr>
+              <a:t>consumes &lt;- content-type</a:t>
             </a:r>
           </a:p>
         </p:txBody>
@@ -9176,12 +9247,97 @@
             <p:ph idx="1"/>
           </p:nvPr>
         </p:nvSpPr>
-        <p:spPr/>
+        <p:spPr>
+          <a:xfrm>
+            <a:off x="267629" y="1780210"/>
+            <a:ext cx="8686800" cy="4877068"/>
+          </a:xfrm>
+        </p:spPr>
         <p:txBody>
           <a:bodyPr/>
           <a:lstStyle/>
           <a:p>
+            <a:pPr marL="0" indent="0">
+              <a:buNone/>
+            </a:pPr>
+            <a:r>
+              <a:rPr lang="en-US" dirty="0"/>
+              <a:t>Assignment</a:t>
+            </a:r>
+          </a:p>
+          <a:p>
+            <a:pPr lvl="1"/>
+            <a:r>
+              <a:rPr lang="en-US" dirty="0"/>
+              <a:t>BHT has a employee system – write controller to do: </a:t>
+            </a:r>
+          </a:p>
+          <a:p>
+            <a:pPr lvl="2"/>
+            <a:r>
+              <a:rPr lang="en-US" dirty="0"/>
+              <a:t>add new employee // update employee address </a:t>
+            </a:r>
+          </a:p>
+          <a:p>
+            <a:pPr lvl="2"/>
+            <a:r>
+              <a:rPr lang="en-US" dirty="0"/>
+              <a:t>Get employee by Id // delete employee by Id</a:t>
+            </a:r>
+          </a:p>
+          <a:p>
+            <a:pPr marL="800100" lvl="1"/>
+            <a:r>
+              <a:rPr lang="en-US" dirty="0"/>
+              <a:t>Library manages books – write controller to do:</a:t>
+            </a:r>
+          </a:p>
+          <a:p>
+            <a:pPr marL="1200150" lvl="2"/>
+            <a:r>
+              <a:rPr lang="en-US" dirty="0"/>
+              <a:t>Add a new book/ update book description // get book by name // delete book by ISBN</a:t>
+            </a:r>
+          </a:p>
+          <a:p>
+            <a:pPr marL="571500" lvl="1" indent="0">
+              <a:buNone/>
+            </a:pPr>
             <a:endParaRPr lang="en-US" dirty="0"/>
+          </a:p>
+          <a:p>
+            <a:pPr marL="571500" lvl="1" indent="0">
+              <a:buNone/>
+            </a:pPr>
+            <a:r>
+              <a:rPr lang="en-US" dirty="0"/>
+              <a:t>Optional: add cross origin / user header / generate xml and json format</a:t>
+            </a:r>
+          </a:p>
+          <a:p>
+            <a:pPr marL="571500" lvl="1" indent="0">
+              <a:buNone/>
+            </a:pPr>
+            <a:endParaRPr lang="en-US" dirty="0"/>
+          </a:p>
+          <a:p>
+            <a:pPr marL="571500" lvl="1" indent="0">
+              <a:buNone/>
+            </a:pPr>
+            <a:r>
+              <a:rPr lang="en-US" dirty="0"/>
+              <a:t>Your demo project has to be runnable and testable by Postman</a:t>
+            </a:r>
+          </a:p>
+          <a:p>
+            <a:pPr marL="571500" lvl="1" indent="0">
+              <a:buNone/>
+            </a:pPr>
+            <a:r>
+              <a:rPr lang="en-US" dirty="0"/>
+              <a:t>(Spring boot / Tomcat / Postman / Maven)</a:t>
+            </a:r>
           </a:p>
         </p:txBody>
       </p:sp>

</xml_diff>